<commit_message>
Update Logic component class diagram to reflect changes made in export command
</commit_message>
<xml_diff>
--- a/docs/diagrams/LogicComponentClassDiagram.pptx
+++ b/docs/diagrams/LogicComponentClassDiagram.pptx
@@ -212,7 +212,7 @@
           <a:p>
             <a:fld id="{F5CC4B3F-88C1-4FFA-B1B6-F41C21DC6924}" type="datetimeFigureOut">
               <a:rPr lang="en-US" smtClean="0"/>
-              <a:t>7/20/17</a:t>
+              <a:t>23-Oct-17</a:t>
             </a:fld>
             <a:endParaRPr lang="en-US"/>
           </a:p>
@@ -658,7 +658,7 @@
           <a:p>
             <a:fld id="{78C97017-6FC3-485B-9764-EAC9E56C1D49}" type="datetimeFigureOut">
               <a:rPr lang="en-US" smtClean="0"/>
-              <a:t>7/20/17</a:t>
+              <a:t>23-Oct-17</a:t>
             </a:fld>
             <a:endParaRPr lang="en-US"/>
           </a:p>
@@ -826,7 +826,7 @@
           <a:p>
             <a:fld id="{78C97017-6FC3-485B-9764-EAC9E56C1D49}" type="datetimeFigureOut">
               <a:rPr lang="en-US" smtClean="0"/>
-              <a:t>7/20/17</a:t>
+              <a:t>23-Oct-17</a:t>
             </a:fld>
             <a:endParaRPr lang="en-US"/>
           </a:p>
@@ -1004,7 +1004,7 @@
           <a:p>
             <a:fld id="{78C97017-6FC3-485B-9764-EAC9E56C1D49}" type="datetimeFigureOut">
               <a:rPr lang="en-US" smtClean="0"/>
-              <a:t>7/20/17</a:t>
+              <a:t>23-Oct-17</a:t>
             </a:fld>
             <a:endParaRPr lang="en-US"/>
           </a:p>
@@ -1172,7 +1172,7 @@
           <a:p>
             <a:fld id="{78C97017-6FC3-485B-9764-EAC9E56C1D49}" type="datetimeFigureOut">
               <a:rPr lang="en-US" smtClean="0"/>
-              <a:t>7/20/17</a:t>
+              <a:t>23-Oct-17</a:t>
             </a:fld>
             <a:endParaRPr lang="en-US"/>
           </a:p>
@@ -1417,7 +1417,7 @@
           <a:p>
             <a:fld id="{78C97017-6FC3-485B-9764-EAC9E56C1D49}" type="datetimeFigureOut">
               <a:rPr lang="en-US" smtClean="0"/>
-              <a:t>7/20/17</a:t>
+              <a:t>23-Oct-17</a:t>
             </a:fld>
             <a:endParaRPr lang="en-US"/>
           </a:p>
@@ -1702,7 +1702,7 @@
           <a:p>
             <a:fld id="{78C97017-6FC3-485B-9764-EAC9E56C1D49}" type="datetimeFigureOut">
               <a:rPr lang="en-US" smtClean="0"/>
-              <a:t>7/20/17</a:t>
+              <a:t>23-Oct-17</a:t>
             </a:fld>
             <a:endParaRPr lang="en-US"/>
           </a:p>
@@ -2121,7 +2121,7 @@
           <a:p>
             <a:fld id="{78C97017-6FC3-485B-9764-EAC9E56C1D49}" type="datetimeFigureOut">
               <a:rPr lang="en-US" smtClean="0"/>
-              <a:t>7/20/17</a:t>
+              <a:t>23-Oct-17</a:t>
             </a:fld>
             <a:endParaRPr lang="en-US"/>
           </a:p>
@@ -2238,7 +2238,7 @@
           <a:p>
             <a:fld id="{78C97017-6FC3-485B-9764-EAC9E56C1D49}" type="datetimeFigureOut">
               <a:rPr lang="en-US" smtClean="0"/>
-              <a:t>7/20/17</a:t>
+              <a:t>23-Oct-17</a:t>
             </a:fld>
             <a:endParaRPr lang="en-US"/>
           </a:p>
@@ -2333,7 +2333,7 @@
           <a:p>
             <a:fld id="{78C97017-6FC3-485B-9764-EAC9E56C1D49}" type="datetimeFigureOut">
               <a:rPr lang="en-US" smtClean="0"/>
-              <a:t>7/20/17</a:t>
+              <a:t>23-Oct-17</a:t>
             </a:fld>
             <a:endParaRPr lang="en-US"/>
           </a:p>
@@ -2608,7 +2608,7 @@
           <a:p>
             <a:fld id="{78C97017-6FC3-485B-9764-EAC9E56C1D49}" type="datetimeFigureOut">
               <a:rPr lang="en-US" smtClean="0"/>
-              <a:t>7/20/17</a:t>
+              <a:t>23-Oct-17</a:t>
             </a:fld>
             <a:endParaRPr lang="en-US"/>
           </a:p>
@@ -2860,7 +2860,7 @@
           <a:p>
             <a:fld id="{78C97017-6FC3-485B-9764-EAC9E56C1D49}" type="datetimeFigureOut">
               <a:rPr lang="en-US" smtClean="0"/>
-              <a:t>7/20/17</a:t>
+              <a:t>23-Oct-17</a:t>
             </a:fld>
             <a:endParaRPr lang="en-US"/>
           </a:p>
@@ -3071,7 +3071,7 @@
           <a:p>
             <a:fld id="{78C97017-6FC3-485B-9764-EAC9E56C1D49}" type="datetimeFigureOut">
               <a:rPr lang="en-US" smtClean="0"/>
-              <a:t>7/20/17</a:t>
+              <a:t>23-Oct-17</a:t>
             </a:fld>
             <a:endParaRPr lang="en-US"/>
           </a:p>
@@ -3492,14 +3492,14 @@
           <a:lstStyle/>
           <a:p>
             <a:r>
-              <a:rPr lang="en-US" sz="1200" b="1" dirty="0">
+              <a:rPr lang="en-US" sz="1200" b="1">
                 <a:solidFill>
                   <a:srgbClr val="0070C0"/>
                 </a:solidFill>
               </a:rPr>
               <a:t>Logic</a:t>
             </a:r>
-            <a:endParaRPr lang="en-SG" sz="1200" b="1" dirty="0">
+            <a:endParaRPr lang="en-SG" sz="1200" b="1">
               <a:solidFill>
                 <a:srgbClr val="0070C0"/>
               </a:solidFill>
@@ -3551,14 +3551,14 @@
           <a:p>
             <a:pPr algn="ctr"/>
             <a:r>
-              <a:rPr lang="en-US" sz="1050" dirty="0" err="1">
+              <a:rPr lang="en-US" sz="1050" err="1">
                 <a:solidFill>
                   <a:schemeClr val="bg1"/>
                 </a:solidFill>
               </a:rPr>
               <a:t>CommandResult</a:t>
             </a:r>
-            <a:endParaRPr lang="en-SG" sz="1050" dirty="0">
+            <a:endParaRPr lang="en-SG" sz="1050">
               <a:solidFill>
                 <a:schemeClr val="bg1"/>
               </a:solidFill>
@@ -3607,14 +3607,14 @@
           <a:p>
             <a:pPr algn="ctr"/>
             <a:r>
-              <a:rPr lang="en-US" sz="1050" b="1" dirty="0" err="1" smtClean="0">
+              <a:rPr lang="en-US" sz="1050" b="1" err="1">
                 <a:solidFill>
                   <a:srgbClr val="0070C0"/>
                 </a:solidFill>
               </a:rPr>
               <a:t>XYZCommand</a:t>
             </a:r>
-            <a:endParaRPr lang="en-SG" sz="1050" b="1" dirty="0">
+            <a:endParaRPr lang="en-SG" sz="1050" b="1">
               <a:solidFill>
                 <a:srgbClr val="0070C0"/>
               </a:solidFill>
@@ -3666,14 +3666,14 @@
           <a:p>
             <a:pPr algn="ctr"/>
             <a:r>
-              <a:rPr lang="en-US" sz="1050" dirty="0" err="1">
+              <a:rPr lang="en-US" sz="1050" err="1">
                 <a:solidFill>
                   <a:schemeClr val="bg1"/>
                 </a:solidFill>
               </a:rPr>
               <a:t>LogicManager</a:t>
             </a:r>
-            <a:endParaRPr lang="en-SG" sz="1050" dirty="0">
+            <a:endParaRPr lang="en-SG" sz="1050">
               <a:solidFill>
                 <a:schemeClr val="bg1"/>
               </a:solidFill>
@@ -3776,8 +3776,8 @@
         </p:nvSpPr>
         <p:spPr>
           <a:xfrm>
-            <a:off x="1103085" y="4777355"/>
-            <a:ext cx="7050315" cy="328045"/>
+            <a:off x="1066800" y="4787538"/>
+            <a:ext cx="3397521" cy="328612"/>
           </a:xfrm>
           <a:prstGeom prst="roundRect">
             <a:avLst/>
@@ -3813,14 +3813,14 @@
           <a:p>
             <a:pPr algn="ctr"/>
             <a:r>
-              <a:rPr lang="en-US" sz="1100" b="1" dirty="0">
+              <a:rPr lang="en-US" sz="1100" b="1">
                 <a:solidFill>
                   <a:schemeClr val="bg1"/>
                 </a:solidFill>
               </a:rPr>
               <a:t>Model</a:t>
             </a:r>
-            <a:endParaRPr lang="en-SG" sz="1100" b="1" dirty="0">
+            <a:endParaRPr lang="en-SG" sz="1100" b="1">
               <a:solidFill>
                 <a:schemeClr val="bg1"/>
               </a:solidFill>
@@ -3869,7 +3869,7 @@
           <a:p>
             <a:pPr algn="ctr"/>
             <a:r>
-              <a:rPr lang="en-US" sz="1050" b="1" dirty="0">
+              <a:rPr lang="en-US" sz="1050" b="1">
                 <a:solidFill>
                   <a:srgbClr val="0070C0"/>
                 </a:solidFill>
@@ -3877,21 +3877,21 @@
               <a:t>{abstract}</a:t>
             </a:r>
             <a:br>
-              <a:rPr lang="en-US" sz="1050" b="1" dirty="0">
+              <a:rPr lang="en-US" sz="1050" b="1">
                 <a:solidFill>
                   <a:srgbClr val="0070C0"/>
                 </a:solidFill>
               </a:rPr>
             </a:br>
             <a:r>
-              <a:rPr lang="en-US" sz="1050" b="1" dirty="0">
+              <a:rPr lang="en-US" sz="1050" b="1">
                 <a:solidFill>
                   <a:srgbClr val="0070C0"/>
                 </a:solidFill>
               </a:rPr>
               <a:t>Command</a:t>
             </a:r>
-            <a:endParaRPr lang="en-SG" sz="1050" b="1" dirty="0">
+            <a:endParaRPr lang="en-SG" sz="1050" b="1">
               <a:solidFill>
                 <a:srgbClr val="0070C0"/>
               </a:solidFill>
@@ -3939,14 +3939,14 @@
           <a:p>
             <a:pPr algn="ctr"/>
             <a:r>
-              <a:rPr lang="en-US" sz="1050" dirty="0" err="1" smtClean="0">
+              <a:rPr lang="en-US" sz="1050" err="1">
                 <a:solidFill>
                   <a:schemeClr val="bg1"/>
                 </a:solidFill>
               </a:rPr>
               <a:t>AddressBook</a:t>
             </a:r>
-            <a:endParaRPr lang="en-US" sz="1050" dirty="0">
+            <a:endParaRPr lang="en-US" sz="1050">
               <a:solidFill>
                 <a:schemeClr val="bg1"/>
               </a:solidFill>
@@ -3955,14 +3955,14 @@
           <a:p>
             <a:pPr algn="ctr"/>
             <a:r>
-              <a:rPr lang="en-US" sz="1050" dirty="0">
+              <a:rPr lang="en-US" sz="1050">
                 <a:solidFill>
                   <a:schemeClr val="bg1"/>
                 </a:solidFill>
               </a:rPr>
               <a:t>Parser</a:t>
             </a:r>
-            <a:endParaRPr lang="en-SG" sz="1050" dirty="0">
+            <a:endParaRPr lang="en-SG" sz="1050">
               <a:solidFill>
                 <a:schemeClr val="bg1"/>
               </a:solidFill>
@@ -4055,7 +4055,7 @@
           <a:p>
             <a:pPr algn="ctr"/>
             <a:r>
-              <a:rPr lang="en-US" sz="1050" dirty="0">
+              <a:rPr lang="en-US" sz="1050">
                 <a:solidFill>
                   <a:schemeClr val="bg1"/>
                 </a:solidFill>
@@ -4066,14 +4066,14 @@
           <a:p>
             <a:pPr algn="ctr"/>
             <a:r>
-              <a:rPr lang="en-US" sz="1050" dirty="0">
+              <a:rPr lang="en-US" sz="1050">
                 <a:solidFill>
                   <a:schemeClr val="bg1"/>
                 </a:solidFill>
               </a:rPr>
               <a:t>Logic</a:t>
             </a:r>
-            <a:endParaRPr lang="en-SG" sz="1050" dirty="0">
+            <a:endParaRPr lang="en-SG" sz="1050">
               <a:solidFill>
                 <a:schemeClr val="bg1"/>
               </a:solidFill>
@@ -4264,18 +4264,18 @@
         <p:nvCxnSpPr>
           <p:cNvPr id="25" name="Elbow Connector 63"/>
           <p:cNvCxnSpPr>
-            <a:endCxn id="12" idx="1"/>
+            <a:cxnSpLocks/>
           </p:cNvCxnSpPr>
           <p:nvPr/>
         </p:nvCxnSpPr>
         <p:spPr>
           <a:xfrm>
             <a:off x="2281833" y="3939492"/>
-            <a:ext cx="4695039" cy="382928"/>
+            <a:ext cx="4678437" cy="287588"/>
           </a:xfrm>
           <a:prstGeom prst="bentConnector3">
             <a:avLst>
-              <a:gd name="adj1" fmla="val -81"/>
+              <a:gd name="adj1" fmla="val 160"/>
             </a:avLst>
           </a:prstGeom>
           <a:ln w="19050">
@@ -4311,7 +4311,7 @@
         </p:nvGrpSpPr>
         <p:grpSpPr>
           <a:xfrm>
-            <a:off x="4597400" y="4341168"/>
+            <a:off x="3504751" y="4007337"/>
             <a:ext cx="889000" cy="230832"/>
             <a:chOff x="2895600" y="807932"/>
             <a:chExt cx="889000" cy="230832"/>
@@ -4440,14 +4440,14 @@
             <a:lstStyle/>
             <a:p>
               <a:r>
-                <a:rPr lang="en-US" sz="1100" dirty="0">
+                <a:rPr lang="en-US" sz="1100">
                   <a:solidFill>
                     <a:srgbClr val="0070C0"/>
                   </a:solidFill>
                 </a:rPr>
                 <a:t>produces</a:t>
               </a:r>
-              <a:endParaRPr lang="en-SG" sz="1100" dirty="0">
+              <a:endParaRPr lang="en-SG" sz="1100">
                 <a:solidFill>
                   <a:srgbClr val="0070C0"/>
                 </a:solidFill>
@@ -4526,14 +4526,14 @@
           <a:p>
             <a:pPr algn="r"/>
             <a:r>
-              <a:rPr lang="en-US" sz="1100" dirty="0">
+              <a:rPr lang="en-US" sz="1100">
                 <a:solidFill>
                   <a:srgbClr val="0070C0"/>
                 </a:solidFill>
               </a:rPr>
               <a:t>1</a:t>
             </a:r>
-            <a:endParaRPr lang="en-SG" sz="1100" dirty="0">
+            <a:endParaRPr lang="en-SG" sz="1100">
               <a:solidFill>
                 <a:srgbClr val="0070C0"/>
               </a:solidFill>
@@ -4654,7 +4654,7 @@
               </a:rPr>
               <a:t>Tokenizer</a:t>
             </a:r>
-            <a:endParaRPr lang="en-SG" sz="1050" dirty="0">
+            <a:endParaRPr lang="en-SG" sz="1050">
               <a:solidFill>
                 <a:schemeClr val="bg1"/>
               </a:solidFill>
@@ -4712,14 +4712,14 @@
           <a:p>
             <a:pPr algn="ctr"/>
             <a:r>
-              <a:rPr lang="en-US" sz="1050" dirty="0">
+              <a:rPr lang="en-US" sz="1050">
                 <a:solidFill>
                   <a:schemeClr val="bg1"/>
                 </a:solidFill>
               </a:rPr>
               <a:t>Prefix</a:t>
             </a:r>
-            <a:endParaRPr lang="en-SG" sz="1050" dirty="0">
+            <a:endParaRPr lang="en-SG" sz="1050">
               <a:solidFill>
                 <a:schemeClr val="bg1"/>
               </a:solidFill>
@@ -4777,14 +4777,14 @@
           <a:p>
             <a:pPr algn="ctr"/>
             <a:r>
-              <a:rPr lang="en-SG" sz="1050" dirty="0" err="1">
+              <a:rPr lang="en-SG" sz="1050" err="1">
                 <a:solidFill>
                   <a:schemeClr val="bg1"/>
                 </a:solidFill>
               </a:rPr>
               <a:t>CliSyntax</a:t>
             </a:r>
-            <a:endParaRPr lang="en-SG" sz="1050" dirty="0">
+            <a:endParaRPr lang="en-SG" sz="1050">
               <a:solidFill>
                 <a:schemeClr val="bg1"/>
               </a:solidFill>
@@ -4842,14 +4842,14 @@
           <a:p>
             <a:pPr algn="ctr"/>
             <a:r>
-              <a:rPr lang="en-SG" sz="1050" dirty="0" err="1">
+              <a:rPr lang="en-SG" sz="1050" err="1">
                 <a:solidFill>
                   <a:schemeClr val="bg1"/>
                 </a:solidFill>
               </a:rPr>
               <a:t>ParserUtil</a:t>
             </a:r>
-            <a:endParaRPr lang="en-SG" sz="1050" dirty="0">
+            <a:endParaRPr lang="en-SG" sz="1050">
               <a:solidFill>
                 <a:schemeClr val="bg1"/>
               </a:solidFill>
@@ -4986,7 +4986,7 @@
             <a:lstStyle/>
             <a:p>
               <a:r>
-                <a:rPr lang="en-US" sz="1100" dirty="0">
+                <a:rPr lang="en-US" sz="1100">
                   <a:solidFill>
                     <a:schemeClr val="accent5">
                       <a:lumMod val="75000"/>
@@ -4995,7 +4995,7 @@
                 </a:rPr>
                 <a:t>creates</a:t>
               </a:r>
-              <a:endParaRPr lang="en-SG" sz="1100" dirty="0">
+              <a:endParaRPr lang="en-SG" sz="1100">
                 <a:solidFill>
                   <a:schemeClr val="accent5">
                     <a:lumMod val="75000"/>
@@ -5244,7 +5244,7 @@
           <a:p>
             <a:pPr algn="ctr"/>
             <a:r>
-              <a:rPr lang="en-SG" sz="1050" dirty="0">
+              <a:rPr lang="en-SG" sz="1050">
                 <a:solidFill>
                   <a:schemeClr val="bg1"/>
                 </a:solidFill>
@@ -5252,14 +5252,14 @@
               <a:t>Argument</a:t>
             </a:r>
             <a:br>
-              <a:rPr lang="en-SG" sz="1050" dirty="0">
+              <a:rPr lang="en-SG" sz="1050">
                 <a:solidFill>
                   <a:schemeClr val="bg1"/>
                 </a:solidFill>
               </a:rPr>
             </a:br>
             <a:r>
-              <a:rPr lang="en-SG" sz="1050" dirty="0">
+              <a:rPr lang="en-SG" sz="1050">
                 <a:solidFill>
                   <a:schemeClr val="bg1"/>
                 </a:solidFill>
@@ -5420,14 +5420,14 @@
           <a:p>
             <a:pPr algn="ctr"/>
             <a:r>
-              <a:rPr lang="en-US" sz="1050" dirty="0">
+              <a:rPr lang="en-US" sz="1050">
                 <a:solidFill>
                   <a:schemeClr val="bg1"/>
                 </a:solidFill>
               </a:rPr>
               <a:t>History</a:t>
             </a:r>
-            <a:endParaRPr lang="en-SG" sz="1050" dirty="0">
+            <a:endParaRPr lang="en-SG" sz="1050">
               <a:solidFill>
                 <a:schemeClr val="bg1"/>
               </a:solidFill>
@@ -5497,14 +5497,14 @@
           <a:p>
             <a:pPr algn="r"/>
             <a:r>
-              <a:rPr lang="en-US" sz="1100" dirty="0">
+              <a:rPr lang="en-US" sz="1100">
                 <a:solidFill>
                   <a:srgbClr val="0070C0"/>
                 </a:solidFill>
               </a:rPr>
               <a:t>1</a:t>
             </a:r>
-            <a:endParaRPr lang="en-SG" sz="1100" dirty="0">
+            <a:endParaRPr lang="en-SG" sz="1100">
               <a:solidFill>
                 <a:srgbClr val="0070C0"/>
               </a:solidFill>
@@ -5517,7 +5517,7 @@
           <p:cNvPr id="97" name="Rectangle 96">
             <a:extLst>
               <a:ext uri="{FF2B5EF4-FFF2-40B4-BE49-F238E27FC236}">
-                <a16:creationId xmlns="" xmlns:a16="http://schemas.microsoft.com/office/drawing/2014/main" id="{AADE6A0C-89AB-467B-8CEA-5FCF36CE0D21}"/>
+                <a16:creationId xmlns:a16="http://schemas.microsoft.com/office/drawing/2014/main" id="{AADE6A0C-89AB-467B-8CEA-5FCF36CE0D21}"/>
               </a:ext>
             </a:extLst>
           </p:cNvPr>
@@ -5558,7 +5558,7 @@
           <a:p>
             <a:pPr algn="ctr"/>
             <a:r>
-              <a:rPr lang="en-US" sz="1050" b="1" dirty="0">
+              <a:rPr lang="en-US" sz="1050" b="1">
                 <a:solidFill>
                   <a:schemeClr val="bg1"/>
                 </a:solidFill>
@@ -5569,14 +5569,14 @@
           <a:p>
             <a:pPr algn="ctr"/>
             <a:r>
-              <a:rPr lang="en-US" sz="1050" b="1" dirty="0">
+              <a:rPr lang="en-US" sz="1050" b="1">
                 <a:solidFill>
                   <a:schemeClr val="bg1"/>
                 </a:solidFill>
               </a:rPr>
               <a:t>Parser</a:t>
             </a:r>
-            <a:endParaRPr lang="en-SG" sz="1050" b="1" dirty="0">
+            <a:endParaRPr lang="en-SG" sz="1050" b="1">
               <a:solidFill>
                 <a:schemeClr val="bg1"/>
               </a:solidFill>
@@ -5666,7 +5666,7 @@
             <a:lstStyle/>
             <a:p>
               <a:r>
-                <a:rPr lang="en-US" sz="1100" dirty="0">
+                <a:rPr lang="en-US" sz="1100">
                   <a:solidFill>
                     <a:schemeClr val="accent5">
                       <a:lumMod val="75000"/>
@@ -5675,7 +5675,7 @@
                 </a:rPr>
                 <a:t>creates</a:t>
               </a:r>
-              <a:endParaRPr lang="en-SG" sz="1100" dirty="0">
+              <a:endParaRPr lang="en-SG" sz="1100">
                 <a:solidFill>
                   <a:schemeClr val="accent5">
                     <a:lumMod val="75000"/>
@@ -5815,14 +5815,14 @@
           <a:p>
             <a:pPr algn="ctr"/>
             <a:r>
-              <a:rPr lang="en-US" sz="1050" b="1" dirty="0" err="1" smtClean="0">
+              <a:rPr lang="en-US" sz="1050" b="1" err="1">
                 <a:solidFill>
                   <a:schemeClr val="bg1"/>
                 </a:solidFill>
               </a:rPr>
               <a:t>XYZCommand</a:t>
             </a:r>
-            <a:endParaRPr lang="en-US" sz="1050" b="1" dirty="0">
+            <a:endParaRPr lang="en-US" sz="1050" b="1">
               <a:solidFill>
                 <a:schemeClr val="bg1"/>
               </a:solidFill>
@@ -5831,14 +5831,14 @@
           <a:p>
             <a:pPr algn="ctr"/>
             <a:r>
-              <a:rPr lang="en-US" sz="1050" b="1" dirty="0">
+              <a:rPr lang="en-US" sz="1050" b="1">
                 <a:solidFill>
                   <a:schemeClr val="bg1"/>
                 </a:solidFill>
               </a:rPr>
               <a:t>Parser</a:t>
             </a:r>
-            <a:endParaRPr lang="en-SG" sz="1050" b="1" dirty="0">
+            <a:endParaRPr lang="en-SG" sz="1050" b="1">
               <a:solidFill>
                 <a:schemeClr val="bg1"/>
               </a:solidFill>
@@ -6165,7 +6165,7 @@
           <a:p>
             <a:pPr algn="ctr"/>
             <a:r>
-              <a:rPr lang="en-US" sz="1050" dirty="0" err="1" smtClean="0">
+              <a:rPr lang="en-US" sz="1050" err="1">
                 <a:solidFill>
                   <a:schemeClr val="bg1"/>
                 </a:solidFill>
@@ -6173,7 +6173,7 @@
               <a:t>XYZCommand</a:t>
             </a:r>
             <a:r>
-              <a:rPr lang="en-US" sz="1050" dirty="0" smtClean="0">
+              <a:rPr lang="en-US" sz="1050">
                 <a:solidFill>
                   <a:schemeClr val="bg1"/>
                 </a:solidFill>
@@ -6181,7 +6181,7 @@
               <a:t> = </a:t>
             </a:r>
             <a:r>
-              <a:rPr lang="en-US" sz="1050" dirty="0" err="1" smtClean="0">
+              <a:rPr lang="en-US" sz="1050" err="1">
                 <a:solidFill>
                   <a:schemeClr val="bg1"/>
                 </a:solidFill>
@@ -6189,7 +6189,7 @@
               <a:t>AddCommand</a:t>
             </a:r>
             <a:r>
-              <a:rPr lang="en-US" sz="1050" dirty="0" smtClean="0">
+              <a:rPr lang="en-US" sz="1050">
                 <a:solidFill>
                   <a:schemeClr val="bg1"/>
                 </a:solidFill>
@@ -6197,7 +6197,7 @@
               <a:t>, </a:t>
             </a:r>
             <a:r>
-              <a:rPr lang="en-US" sz="1050" dirty="0" err="1" smtClean="0">
+              <a:rPr lang="en-US" sz="1050" err="1">
                 <a:solidFill>
                   <a:schemeClr val="bg1"/>
                 </a:solidFill>
@@ -6205,18 +6205,13 @@
               <a:t>FindCommand</a:t>
             </a:r>
             <a:r>
-              <a:rPr lang="en-US" sz="1050" dirty="0" smtClean="0">
+              <a:rPr lang="en-US" sz="1050">
                 <a:solidFill>
                   <a:schemeClr val="bg1"/>
                 </a:solidFill>
               </a:rPr>
               <a:t>, etc.</a:t>
             </a:r>
-            <a:endParaRPr lang="en-US" sz="1050" dirty="0">
-              <a:solidFill>
-                <a:schemeClr val="bg1"/>
-              </a:solidFill>
-            </a:endParaRPr>
           </a:p>
         </p:txBody>
       </p:sp>
@@ -6264,14 +6259,14 @@
           <a:p>
             <a:pPr algn="ctr"/>
             <a:r>
-              <a:rPr lang="en-US" sz="1050" dirty="0" err="1" smtClean="0">
+              <a:rPr lang="en-US" sz="1050" err="1">
                 <a:solidFill>
                   <a:schemeClr val="bg1"/>
                 </a:solidFill>
               </a:rPr>
               <a:t>UndoRedo</a:t>
             </a:r>
-            <a:endParaRPr lang="en-US" sz="1050" dirty="0" smtClean="0">
+            <a:endParaRPr lang="en-US" sz="1050">
               <a:solidFill>
                 <a:schemeClr val="bg1"/>
               </a:solidFill>
@@ -6280,14 +6275,14 @@
           <a:p>
             <a:pPr algn="ctr"/>
             <a:r>
-              <a:rPr lang="en-US" sz="1050" dirty="0" smtClean="0">
+              <a:rPr lang="en-US" sz="1050">
                 <a:solidFill>
                   <a:schemeClr val="bg1"/>
                 </a:solidFill>
               </a:rPr>
               <a:t>Stack</a:t>
             </a:r>
-            <a:endParaRPr lang="en-SG" sz="1050" dirty="0">
+            <a:endParaRPr lang="en-SG" sz="1050">
               <a:solidFill>
                 <a:schemeClr val="bg1"/>
               </a:solidFill>
@@ -6359,14 +6354,14 @@
           <a:p>
             <a:pPr algn="r"/>
             <a:r>
-              <a:rPr lang="en-US" sz="1100" dirty="0">
+              <a:rPr lang="en-US" sz="1100">
                 <a:solidFill>
                   <a:srgbClr val="0070C0"/>
                 </a:solidFill>
               </a:rPr>
               <a:t>1</a:t>
             </a:r>
-            <a:endParaRPr lang="en-SG" sz="1100" dirty="0">
+            <a:endParaRPr lang="en-SG" sz="1100">
               <a:solidFill>
                 <a:srgbClr val="0070C0"/>
               </a:solidFill>
@@ -6374,6 +6369,120 @@
           </a:p>
         </p:txBody>
       </p:sp>
+      <p:sp>
+        <p:nvSpPr>
+          <p:cNvPr id="64" name="Rectangle 65">
+            <a:extLst>
+              <a:ext uri="{FF2B5EF4-FFF2-40B4-BE49-F238E27FC236}">
+                <a16:creationId xmlns:a16="http://schemas.microsoft.com/office/drawing/2014/main" id="{3F4B8BA7-5DA9-4E0B-B5A2-7C809ECD2DE1}"/>
+              </a:ext>
+            </a:extLst>
+          </p:cNvPr>
+          <p:cNvSpPr/>
+          <p:nvPr/>
+        </p:nvSpPr>
+        <p:spPr>
+          <a:xfrm>
+            <a:off x="4746702" y="4787540"/>
+            <a:ext cx="3397521" cy="328612"/>
+          </a:xfrm>
+          <a:prstGeom prst="roundRect">
+            <a:avLst/>
+          </a:prstGeom>
+          <a:solidFill>
+            <a:schemeClr val="accent6">
+              <a:lumMod val="20000"/>
+              <a:lumOff val="80000"/>
+            </a:schemeClr>
+          </a:solidFill>
+          <a:ln w="19050">
+            <a:noFill/>
+          </a:ln>
+          <a:effectLst/>
+        </p:spPr>
+        <p:style>
+          <a:lnRef idx="1">
+            <a:schemeClr val="accent2"/>
+          </a:lnRef>
+          <a:fillRef idx="2">
+            <a:schemeClr val="accent2"/>
+          </a:fillRef>
+          <a:effectRef idx="1">
+            <a:schemeClr val="accent2"/>
+          </a:effectRef>
+          <a:fontRef idx="minor">
+            <a:schemeClr val="dk1"/>
+          </a:fontRef>
+        </p:style>
+        <p:txBody>
+          <a:bodyPr rtlCol="0" anchor="ctr"/>
+          <a:lstStyle/>
+          <a:p>
+            <a:pPr algn="ctr"/>
+            <a:r>
+              <a:rPr lang="en-US" sz="1100" b="1">
+                <a:solidFill>
+                  <a:schemeClr val="bg1"/>
+                </a:solidFill>
+              </a:rPr>
+              <a:t>Storage</a:t>
+            </a:r>
+            <a:endParaRPr lang="en-SG" sz="1100" b="1">
+              <a:solidFill>
+                <a:schemeClr val="bg1"/>
+              </a:solidFill>
+            </a:endParaRPr>
+          </a:p>
+        </p:txBody>
+      </p:sp>
+      <p:cxnSp>
+        <p:nvCxnSpPr>
+          <p:cNvPr id="71" name="Elbow Connector 63">
+            <a:extLst>
+              <a:ext uri="{FF2B5EF4-FFF2-40B4-BE49-F238E27FC236}">
+                <a16:creationId xmlns:a16="http://schemas.microsoft.com/office/drawing/2014/main" id="{2998B4A2-F985-4669-9AD1-3A4AA37B35C9}"/>
+              </a:ext>
+            </a:extLst>
+          </p:cNvPr>
+          <p:cNvCxnSpPr>
+            <a:cxnSpLocks/>
+            <a:endCxn id="9" idx="0"/>
+          </p:cNvCxnSpPr>
+          <p:nvPr/>
+        </p:nvCxnSpPr>
+        <p:spPr>
+          <a:xfrm rot="10800000" flipV="1">
+            <a:off x="2765561" y="4417358"/>
+            <a:ext cx="4194708" cy="370180"/>
+          </a:xfrm>
+          <a:prstGeom prst="bentConnector2">
+            <a:avLst/>
+          </a:prstGeom>
+          <a:ln w="19050">
+            <a:solidFill>
+              <a:srgbClr val="0070C0"/>
+            </a:solidFill>
+            <a:prstDash val="sysDot"/>
+            <a:headEnd type="none" w="med" len="med"/>
+            <a:tailEnd type="arrow" w="med" len="med"/>
+          </a:ln>
+          <a:effectLst/>
+        </p:spPr>
+        <p:style>
+          <a:lnRef idx="1">
+            <a:schemeClr val="accent2"/>
+          </a:lnRef>
+          <a:fillRef idx="2">
+            <a:schemeClr val="accent2"/>
+          </a:fillRef>
+          <a:effectRef idx="1">
+            <a:schemeClr val="accent2"/>
+          </a:effectRef>
+          <a:fontRef idx="minor">
+            <a:schemeClr val="dk1"/>
+          </a:fontRef>
+        </p:style>
+      </p:cxnSp>
     </p:spTree>
     <p:extLst>
       <p:ext uri="{BB962C8B-B14F-4D97-AF65-F5344CB8AC3E}">

</xml_diff>

<commit_message>
Logic and Storage component diagram updates
</commit_message>
<xml_diff>
--- a/docs/diagrams/LogicComponentClassDiagram.pptx
+++ b/docs/diagrams/LogicComponentClassDiagram.pptx
@@ -212,7 +212,7 @@
           <a:p>
             <a:fld id="{F5CC4B3F-88C1-4FFA-B1B6-F41C21DC6924}" type="datetimeFigureOut">
               <a:rPr lang="en-US" smtClean="0"/>
-              <a:t>7/20/17</a:t>
+              <a:t>11/1/2017</a:t>
             </a:fld>
             <a:endParaRPr lang="en-US"/>
           </a:p>
@@ -658,7 +658,7 @@
           <a:p>
             <a:fld id="{78C97017-6FC3-485B-9764-EAC9E56C1D49}" type="datetimeFigureOut">
               <a:rPr lang="en-US" smtClean="0"/>
-              <a:t>7/20/17</a:t>
+              <a:t>11/1/2017</a:t>
             </a:fld>
             <a:endParaRPr lang="en-US"/>
           </a:p>
@@ -826,7 +826,7 @@
           <a:p>
             <a:fld id="{78C97017-6FC3-485B-9764-EAC9E56C1D49}" type="datetimeFigureOut">
               <a:rPr lang="en-US" smtClean="0"/>
-              <a:t>7/20/17</a:t>
+              <a:t>11/1/2017</a:t>
             </a:fld>
             <a:endParaRPr lang="en-US"/>
           </a:p>
@@ -1004,7 +1004,7 @@
           <a:p>
             <a:fld id="{78C97017-6FC3-485B-9764-EAC9E56C1D49}" type="datetimeFigureOut">
               <a:rPr lang="en-US" smtClean="0"/>
-              <a:t>7/20/17</a:t>
+              <a:t>11/1/2017</a:t>
             </a:fld>
             <a:endParaRPr lang="en-US"/>
           </a:p>
@@ -1172,7 +1172,7 @@
           <a:p>
             <a:fld id="{78C97017-6FC3-485B-9764-EAC9E56C1D49}" type="datetimeFigureOut">
               <a:rPr lang="en-US" smtClean="0"/>
-              <a:t>7/20/17</a:t>
+              <a:t>11/1/2017</a:t>
             </a:fld>
             <a:endParaRPr lang="en-US"/>
           </a:p>
@@ -1417,7 +1417,7 @@
           <a:p>
             <a:fld id="{78C97017-6FC3-485B-9764-EAC9E56C1D49}" type="datetimeFigureOut">
               <a:rPr lang="en-US" smtClean="0"/>
-              <a:t>7/20/17</a:t>
+              <a:t>11/1/2017</a:t>
             </a:fld>
             <a:endParaRPr lang="en-US"/>
           </a:p>
@@ -1702,7 +1702,7 @@
           <a:p>
             <a:fld id="{78C97017-6FC3-485B-9764-EAC9E56C1D49}" type="datetimeFigureOut">
               <a:rPr lang="en-US" smtClean="0"/>
-              <a:t>7/20/17</a:t>
+              <a:t>11/1/2017</a:t>
             </a:fld>
             <a:endParaRPr lang="en-US"/>
           </a:p>
@@ -2121,7 +2121,7 @@
           <a:p>
             <a:fld id="{78C97017-6FC3-485B-9764-EAC9E56C1D49}" type="datetimeFigureOut">
               <a:rPr lang="en-US" smtClean="0"/>
-              <a:t>7/20/17</a:t>
+              <a:t>11/1/2017</a:t>
             </a:fld>
             <a:endParaRPr lang="en-US"/>
           </a:p>
@@ -2238,7 +2238,7 @@
           <a:p>
             <a:fld id="{78C97017-6FC3-485B-9764-EAC9E56C1D49}" type="datetimeFigureOut">
               <a:rPr lang="en-US" smtClean="0"/>
-              <a:t>7/20/17</a:t>
+              <a:t>11/1/2017</a:t>
             </a:fld>
             <a:endParaRPr lang="en-US"/>
           </a:p>
@@ -2333,7 +2333,7 @@
           <a:p>
             <a:fld id="{78C97017-6FC3-485B-9764-EAC9E56C1D49}" type="datetimeFigureOut">
               <a:rPr lang="en-US" smtClean="0"/>
-              <a:t>7/20/17</a:t>
+              <a:t>11/1/2017</a:t>
             </a:fld>
             <a:endParaRPr lang="en-US"/>
           </a:p>
@@ -2608,7 +2608,7 @@
           <a:p>
             <a:fld id="{78C97017-6FC3-485B-9764-EAC9E56C1D49}" type="datetimeFigureOut">
               <a:rPr lang="en-US" smtClean="0"/>
-              <a:t>7/20/17</a:t>
+              <a:t>11/1/2017</a:t>
             </a:fld>
             <a:endParaRPr lang="en-US"/>
           </a:p>
@@ -2860,7 +2860,7 @@
           <a:p>
             <a:fld id="{78C97017-6FC3-485B-9764-EAC9E56C1D49}" type="datetimeFigureOut">
               <a:rPr lang="en-US" smtClean="0"/>
-              <a:t>7/20/17</a:t>
+              <a:t>11/1/2017</a:t>
             </a:fld>
             <a:endParaRPr lang="en-US"/>
           </a:p>
@@ -3071,7 +3071,7 @@
           <a:p>
             <a:fld id="{78C97017-6FC3-485B-9764-EAC9E56C1D49}" type="datetimeFigureOut">
               <a:rPr lang="en-US" smtClean="0"/>
-              <a:t>7/20/17</a:t>
+              <a:t>11/1/2017</a:t>
             </a:fld>
             <a:endParaRPr lang="en-US"/>
           </a:p>
@@ -3607,7 +3607,7 @@
           <a:p>
             <a:pPr algn="ctr"/>
             <a:r>
-              <a:rPr lang="en-US" sz="1050" b="1" dirty="0" err="1" smtClean="0">
+              <a:rPr lang="en-US" sz="1050" b="1" dirty="0" err="1">
                 <a:solidFill>
                   <a:srgbClr val="0070C0"/>
                 </a:solidFill>
@@ -3776,7 +3776,7 @@
         </p:nvSpPr>
         <p:spPr>
           <a:xfrm>
-            <a:off x="1103085" y="4777355"/>
+            <a:off x="1066800" y="4776606"/>
             <a:ext cx="7050315" cy="328045"/>
           </a:xfrm>
           <a:prstGeom prst="roundRect">
@@ -3939,7 +3939,7 @@
           <a:p>
             <a:pPr algn="ctr"/>
             <a:r>
-              <a:rPr lang="en-US" sz="1050" dirty="0" err="1" smtClean="0">
+              <a:rPr lang="en-US" sz="1050" dirty="0" err="1">
                 <a:solidFill>
                   <a:schemeClr val="bg1"/>
                 </a:solidFill>
@@ -5517,7 +5517,7 @@
           <p:cNvPr id="97" name="Rectangle 96">
             <a:extLst>
               <a:ext uri="{FF2B5EF4-FFF2-40B4-BE49-F238E27FC236}">
-                <a16:creationId xmlns="" xmlns:a16="http://schemas.microsoft.com/office/drawing/2014/main" id="{AADE6A0C-89AB-467B-8CEA-5FCF36CE0D21}"/>
+                <a16:creationId xmlns:a16="http://schemas.microsoft.com/office/drawing/2014/main" id="{AADE6A0C-89AB-467B-8CEA-5FCF36CE0D21}"/>
               </a:ext>
             </a:extLst>
           </p:cNvPr>
@@ -5815,7 +5815,7 @@
           <a:p>
             <a:pPr algn="ctr"/>
             <a:r>
-              <a:rPr lang="en-US" sz="1050" b="1" dirty="0" err="1" smtClean="0">
+              <a:rPr lang="en-US" sz="1050" b="1" dirty="0" err="1">
                 <a:solidFill>
                   <a:schemeClr val="bg1"/>
                 </a:solidFill>
@@ -6165,7 +6165,7 @@
           <a:p>
             <a:pPr algn="ctr"/>
             <a:r>
-              <a:rPr lang="en-US" sz="1050" dirty="0" err="1" smtClean="0">
+              <a:rPr lang="en-US" sz="1050" dirty="0" err="1">
                 <a:solidFill>
                   <a:schemeClr val="bg1"/>
                 </a:solidFill>
@@ -6173,7 +6173,7 @@
               <a:t>XYZCommand</a:t>
             </a:r>
             <a:r>
-              <a:rPr lang="en-US" sz="1050" dirty="0" smtClean="0">
+              <a:rPr lang="en-US" sz="1050" dirty="0">
                 <a:solidFill>
                   <a:schemeClr val="bg1"/>
                 </a:solidFill>
@@ -6181,7 +6181,7 @@
               <a:t> = </a:t>
             </a:r>
             <a:r>
-              <a:rPr lang="en-US" sz="1050" dirty="0" err="1" smtClean="0">
+              <a:rPr lang="en-US" sz="1050" dirty="0" err="1">
                 <a:solidFill>
                   <a:schemeClr val="bg1"/>
                 </a:solidFill>
@@ -6189,7 +6189,7 @@
               <a:t>AddCommand</a:t>
             </a:r>
             <a:r>
-              <a:rPr lang="en-US" sz="1050" dirty="0" smtClean="0">
+              <a:rPr lang="en-US" sz="1050" dirty="0">
                 <a:solidFill>
                   <a:schemeClr val="bg1"/>
                 </a:solidFill>
@@ -6197,7 +6197,7 @@
               <a:t>, </a:t>
             </a:r>
             <a:r>
-              <a:rPr lang="en-US" sz="1050" dirty="0" err="1" smtClean="0">
+              <a:rPr lang="en-US" sz="1050" dirty="0" err="1">
                 <a:solidFill>
                   <a:schemeClr val="bg1"/>
                 </a:solidFill>
@@ -6205,18 +6205,13 @@
               <a:t>FindCommand</a:t>
             </a:r>
             <a:r>
-              <a:rPr lang="en-US" sz="1050" dirty="0" smtClean="0">
+              <a:rPr lang="en-US" sz="1050" dirty="0">
                 <a:solidFill>
                   <a:schemeClr val="bg1"/>
                 </a:solidFill>
               </a:rPr>
               <a:t>, etc.</a:t>
             </a:r>
-            <a:endParaRPr lang="en-US" sz="1050" dirty="0">
-              <a:solidFill>
-                <a:schemeClr val="bg1"/>
-              </a:solidFill>
-            </a:endParaRPr>
           </a:p>
         </p:txBody>
       </p:sp>
@@ -6264,14 +6259,14 @@
           <a:p>
             <a:pPr algn="ctr"/>
             <a:r>
-              <a:rPr lang="en-US" sz="1050" dirty="0" err="1" smtClean="0">
+              <a:rPr lang="en-US" sz="1050" dirty="0" err="1">
                 <a:solidFill>
                   <a:schemeClr val="bg1"/>
                 </a:solidFill>
               </a:rPr>
               <a:t>UndoRedo</a:t>
             </a:r>
-            <a:endParaRPr lang="en-US" sz="1050" dirty="0" smtClean="0">
+            <a:endParaRPr lang="en-US" sz="1050" dirty="0">
               <a:solidFill>
                 <a:schemeClr val="bg1"/>
               </a:solidFill>
@@ -6280,7 +6275,7 @@
           <a:p>
             <a:pPr algn="ctr"/>
             <a:r>
-              <a:rPr lang="en-US" sz="1050" dirty="0" smtClean="0">
+              <a:rPr lang="en-US" sz="1050" dirty="0">
                 <a:solidFill>
                   <a:schemeClr val="bg1"/>
                 </a:solidFill>
@@ -6374,6 +6369,118 @@
           </a:p>
         </p:txBody>
       </p:sp>
+      <p:sp>
+        <p:nvSpPr>
+          <p:cNvPr id="64" name="Rectangle 65">
+            <a:extLst>
+              <a:ext uri="{FF2B5EF4-FFF2-40B4-BE49-F238E27FC236}">
+                <a16:creationId xmlns:a16="http://schemas.microsoft.com/office/drawing/2014/main" id="{36A38CAA-4BA2-43DB-B420-F49AFC68887E}"/>
+              </a:ext>
+            </a:extLst>
+          </p:cNvPr>
+          <p:cNvSpPr/>
+          <p:nvPr/>
+        </p:nvSpPr>
+        <p:spPr>
+          <a:xfrm>
+            <a:off x="1072242" y="5223192"/>
+            <a:ext cx="7050315" cy="328045"/>
+          </a:xfrm>
+          <a:prstGeom prst="roundRect">
+            <a:avLst/>
+          </a:prstGeom>
+          <a:solidFill>
+            <a:schemeClr val="accent4">
+              <a:lumMod val="20000"/>
+              <a:lumOff val="80000"/>
+            </a:schemeClr>
+          </a:solidFill>
+          <a:ln w="19050">
+            <a:noFill/>
+          </a:ln>
+          <a:effectLst/>
+        </p:spPr>
+        <p:style>
+          <a:lnRef idx="1">
+            <a:schemeClr val="accent2"/>
+          </a:lnRef>
+          <a:fillRef idx="2">
+            <a:schemeClr val="accent2"/>
+          </a:fillRef>
+          <a:effectRef idx="1">
+            <a:schemeClr val="accent2"/>
+          </a:effectRef>
+          <a:fontRef idx="minor">
+            <a:schemeClr val="dk1"/>
+          </a:fontRef>
+        </p:style>
+        <p:txBody>
+          <a:bodyPr rtlCol="0" anchor="ctr"/>
+          <a:lstStyle/>
+          <a:p>
+            <a:pPr algn="ctr"/>
+            <a:r>
+              <a:rPr lang="en-US" sz="1100" b="1" dirty="0">
+                <a:solidFill>
+                  <a:schemeClr val="bg1"/>
+                </a:solidFill>
+              </a:rPr>
+              <a:t>Storage</a:t>
+            </a:r>
+            <a:endParaRPr lang="en-SG" sz="1100" b="1" dirty="0">
+              <a:solidFill>
+                <a:schemeClr val="bg1"/>
+              </a:solidFill>
+            </a:endParaRPr>
+          </a:p>
+        </p:txBody>
+      </p:sp>
+      <p:cxnSp>
+        <p:nvCxnSpPr>
+          <p:cNvPr id="65" name="Straight Arrow Connector 57">
+            <a:extLst>
+              <a:ext uri="{FF2B5EF4-FFF2-40B4-BE49-F238E27FC236}">
+                <a16:creationId xmlns:a16="http://schemas.microsoft.com/office/drawing/2014/main" id="{8DC0162D-4E10-43AF-A8B0-3478CDF5EB42}"/>
+              </a:ext>
+            </a:extLst>
+          </p:cNvPr>
+          <p:cNvCxnSpPr>
+            <a:cxnSpLocks/>
+          </p:cNvCxnSpPr>
+          <p:nvPr/>
+        </p:nvCxnSpPr>
+        <p:spPr>
+          <a:xfrm flipH="1">
+            <a:off x="2139592" y="3939492"/>
+            <a:ext cx="1389" cy="1283700"/>
+          </a:xfrm>
+          <a:prstGeom prst="straightConnector1">
+            <a:avLst/>
+          </a:prstGeom>
+          <a:ln w="19050">
+            <a:solidFill>
+              <a:srgbClr val="0070C0"/>
+            </a:solidFill>
+            <a:headEnd type="none" w="med" len="med"/>
+            <a:tailEnd type="arrow" w="med" len="med"/>
+          </a:ln>
+          <a:effectLst/>
+        </p:spPr>
+        <p:style>
+          <a:lnRef idx="1">
+            <a:schemeClr val="accent2"/>
+          </a:lnRef>
+          <a:fillRef idx="2">
+            <a:schemeClr val="accent2"/>
+          </a:fillRef>
+          <a:effectRef idx="1">
+            <a:schemeClr val="accent2"/>
+          </a:effectRef>
+          <a:fontRef idx="minor">
+            <a:schemeClr val="dk1"/>
+          </a:fontRef>
+        </p:style>
+      </p:cxnSp>
     </p:spTree>
     <p:extLst>
       <p:ext uri="{BB962C8B-B14F-4D97-AF65-F5344CB8AC3E}">

</xml_diff>